<commit_message>
Added the system deployment document.
</commit_message>
<xml_diff>
--- a/1_Introduction_Doc/2_Product_Introduction.pptx
+++ b/1_Introduction_Doc/2_Product_Introduction.pptx
@@ -206,7 +206,7 @@
           <a:p>
             <a:fld id="{AE542EE5-636A-4C1E-9A32-D4BF9A08B586}" type="datetimeFigureOut">
               <a:rPr lang="en-SG" smtClean="0"/>
-              <a:t>17/2/2025</a:t>
+              <a:t>9/4/2025</a:t>
             </a:fld>
             <a:endParaRPr lang="en-SG"/>
           </a:p>
@@ -899,7 +899,7 @@
           <a:p>
             <a:fld id="{CDABA62A-970D-44BA-BCA4-FF1EE97A39D4}" type="datetimeFigureOut">
               <a:rPr lang="en-SG" smtClean="0"/>
-              <a:t>17/2/2025</a:t>
+              <a:t>9/4/2025</a:t>
             </a:fld>
             <a:endParaRPr lang="en-SG"/>
           </a:p>
@@ -1099,7 +1099,7 @@
           <a:p>
             <a:fld id="{CDABA62A-970D-44BA-BCA4-FF1EE97A39D4}" type="datetimeFigureOut">
               <a:rPr lang="en-SG" smtClean="0"/>
-              <a:t>17/2/2025</a:t>
+              <a:t>9/4/2025</a:t>
             </a:fld>
             <a:endParaRPr lang="en-SG"/>
           </a:p>
@@ -1309,7 +1309,7 @@
           <a:p>
             <a:fld id="{CDABA62A-970D-44BA-BCA4-FF1EE97A39D4}" type="datetimeFigureOut">
               <a:rPr lang="en-SG" smtClean="0"/>
-              <a:t>17/2/2025</a:t>
+              <a:t>9/4/2025</a:t>
             </a:fld>
             <a:endParaRPr lang="en-SG"/>
           </a:p>
@@ -1509,7 +1509,7 @@
           <a:p>
             <a:fld id="{CDABA62A-970D-44BA-BCA4-FF1EE97A39D4}" type="datetimeFigureOut">
               <a:rPr lang="en-SG" smtClean="0"/>
-              <a:t>17/2/2025</a:t>
+              <a:t>9/4/2025</a:t>
             </a:fld>
             <a:endParaRPr lang="en-SG"/>
           </a:p>
@@ -1785,7 +1785,7 @@
           <a:p>
             <a:fld id="{CDABA62A-970D-44BA-BCA4-FF1EE97A39D4}" type="datetimeFigureOut">
               <a:rPr lang="en-SG" smtClean="0"/>
-              <a:t>17/2/2025</a:t>
+              <a:t>9/4/2025</a:t>
             </a:fld>
             <a:endParaRPr lang="en-SG"/>
           </a:p>
@@ -2053,7 +2053,7 @@
           <a:p>
             <a:fld id="{CDABA62A-970D-44BA-BCA4-FF1EE97A39D4}" type="datetimeFigureOut">
               <a:rPr lang="en-SG" smtClean="0"/>
-              <a:t>17/2/2025</a:t>
+              <a:t>9/4/2025</a:t>
             </a:fld>
             <a:endParaRPr lang="en-SG"/>
           </a:p>
@@ -2468,7 +2468,7 @@
           <a:p>
             <a:fld id="{CDABA62A-970D-44BA-BCA4-FF1EE97A39D4}" type="datetimeFigureOut">
               <a:rPr lang="en-SG" smtClean="0"/>
-              <a:t>17/2/2025</a:t>
+              <a:t>9/4/2025</a:t>
             </a:fld>
             <a:endParaRPr lang="en-SG"/>
           </a:p>
@@ -2610,7 +2610,7 @@
           <a:p>
             <a:fld id="{CDABA62A-970D-44BA-BCA4-FF1EE97A39D4}" type="datetimeFigureOut">
               <a:rPr lang="en-SG" smtClean="0"/>
-              <a:t>17/2/2025</a:t>
+              <a:t>9/4/2025</a:t>
             </a:fld>
             <a:endParaRPr lang="en-SG"/>
           </a:p>
@@ -2723,7 +2723,7 @@
           <a:p>
             <a:fld id="{CDABA62A-970D-44BA-BCA4-FF1EE97A39D4}" type="datetimeFigureOut">
               <a:rPr lang="en-SG" smtClean="0"/>
-              <a:t>17/2/2025</a:t>
+              <a:t>9/4/2025</a:t>
             </a:fld>
             <a:endParaRPr lang="en-SG"/>
           </a:p>
@@ -3036,7 +3036,7 @@
           <a:p>
             <a:fld id="{CDABA62A-970D-44BA-BCA4-FF1EE97A39D4}" type="datetimeFigureOut">
               <a:rPr lang="en-SG" smtClean="0"/>
-              <a:t>17/2/2025</a:t>
+              <a:t>9/4/2025</a:t>
             </a:fld>
             <a:endParaRPr lang="en-SG"/>
           </a:p>
@@ -3325,7 +3325,7 @@
           <a:p>
             <a:fld id="{CDABA62A-970D-44BA-BCA4-FF1EE97A39D4}" type="datetimeFigureOut">
               <a:rPr lang="en-SG" smtClean="0"/>
-              <a:t>17/2/2025</a:t>
+              <a:t>9/4/2025</a:t>
             </a:fld>
             <a:endParaRPr lang="en-SG"/>
           </a:p>
@@ -3568,7 +3568,7 @@
           <a:p>
             <a:fld id="{CDABA62A-970D-44BA-BCA4-FF1EE97A39D4}" type="datetimeFigureOut">
               <a:rPr lang="en-SG" smtClean="0"/>
-              <a:t>17/2/2025</a:t>
+              <a:t>9/4/2025</a:t>
             </a:fld>
             <a:endParaRPr lang="en-SG"/>
           </a:p>
@@ -4235,12 +4235,12 @@
           </a:p>
           <a:p>
             <a:r>
-              <a:rPr lang="en-US" b="1" dirty="0">
+              <a:rPr lang="en-US" b="1">
                 <a:solidFill>
                   <a:srgbClr val="1F2328"/>
                 </a:solidFill>
               </a:rPr>
-              <a:t>07 Feb 2025</a:t>
+              <a:t>07 Apr 2025</a:t>
             </a:r>
             <a:endParaRPr lang="en-US" sz="1800" b="1" i="0" dirty="0">
               <a:solidFill>

</xml_diff>